<commit_message>
added powerPoint show - use it instead of .pptx
</commit_message>
<xml_diff>
--- a/final-project/NLP Project.pptx
+++ b/final-project/NLP Project.pptx
@@ -259,7 +259,7 @@
           <a:p>
             <a:fld id="{9C32D420-7C4D-48E6-B95A-70B5881CE38A}" type="datetimeFigureOut">
               <a:rPr lang="es-ES" smtClean="0"/>
-              <a:t>19/12/2018</a:t>
+              <a:t>29/12/2018</a:t>
             </a:fld>
             <a:endParaRPr lang="es-ES"/>
           </a:p>
@@ -1468,7 +1468,7 @@
             <a:fld id="{1E700B27-DE4C-4B9E-BB11-B9027034A00F}" type="datetimeFigureOut">
               <a:rPr lang="en-US" dirty="0"/>
               <a:pPr/>
-              <a:t>12/19/2018</a:t>
+              <a:t>12/29/2018</a:t>
             </a:fld>
             <a:endParaRPr lang="en-US" dirty="0"/>
           </a:p>
@@ -2588,7 +2588,7 @@
           <a:p>
             <a:fld id="{C40F4739-9812-4A9F-890D-2AD6BA5F6EE8}" type="datetimeFigureOut">
               <a:rPr lang="en-US" dirty="0"/>
-              <a:t>12/19/2018</a:t>
+              <a:t>12/29/2018</a:t>
             </a:fld>
             <a:endParaRPr lang="en-US" dirty="0"/>
           </a:p>
@@ -3599,7 +3599,7 @@
           <a:p>
             <a:fld id="{18845AC5-A3F8-44AA-BA8F-596CDCC976D3}" type="datetimeFigureOut">
               <a:rPr lang="en-US" dirty="0"/>
-              <a:t>12/19/2018</a:t>
+              <a:t>12/29/2018</a:t>
             </a:fld>
             <a:endParaRPr lang="en-US" dirty="0"/>
           </a:p>
@@ -4769,7 +4769,7 @@
           <a:p>
             <a:fld id="{C873B183-A821-4095-A363-9EC968635539}" type="datetimeFigureOut">
               <a:rPr lang="en-US" dirty="0"/>
-              <a:t>12/19/2018</a:t>
+              <a:t>12/29/2018</a:t>
             </a:fld>
             <a:endParaRPr lang="en-US" dirty="0"/>
           </a:p>
@@ -5830,7 +5830,7 @@
           <a:p>
             <a:fld id="{174D01B4-0AA5-45E6-B2E6-5FA4078AEBCF}" type="datetimeFigureOut">
               <a:rPr lang="en-US" dirty="0"/>
-              <a:t>12/19/2018</a:t>
+              <a:t>12/29/2018</a:t>
             </a:fld>
             <a:endParaRPr lang="en-US" dirty="0"/>
           </a:p>
@@ -6476,7 +6476,7 @@
           <a:p>
             <a:fld id="{4147335C-0450-40D7-8612-B3203BED4F28}" type="datetimeFigureOut">
               <a:rPr lang="en-US" dirty="0"/>
-              <a:t>12/19/2018</a:t>
+              <a:t>12/29/2018</a:t>
             </a:fld>
             <a:endParaRPr lang="en-US" dirty="0"/>
           </a:p>
@@ -7323,7 +7323,7 @@
           <a:p>
             <a:fld id="{D246A105-2A1C-4284-B4EA-07CF89B1A393}" type="datetimeFigureOut">
               <a:rPr lang="en-US" dirty="0"/>
-              <a:t>12/19/2018</a:t>
+              <a:t>12/29/2018</a:t>
             </a:fld>
             <a:endParaRPr lang="en-US" dirty="0"/>
           </a:p>
@@ -7498,7 +7498,7 @@
           <a:p>
             <a:fld id="{80DBE609-F3F2-45E6-BD6A-E03A8C86C1AE}" type="datetimeFigureOut">
               <a:rPr lang="en-US" dirty="0"/>
-              <a:t>12/19/2018</a:t>
+              <a:t>12/29/2018</a:t>
             </a:fld>
             <a:endParaRPr lang="en-US" dirty="0"/>
           </a:p>
@@ -8496,7 +8496,7 @@
           <a:p>
             <a:fld id="{7A24AD68-089C-4467-A8F3-EA2BBCA6B44E}" type="datetimeFigureOut">
               <a:rPr lang="en-US" dirty="0"/>
-              <a:t>12/19/2018</a:t>
+              <a:t>12/29/2018</a:t>
             </a:fld>
             <a:endParaRPr lang="en-US" dirty="0"/>
           </a:p>
@@ -8894,7 +8894,7 @@
           <a:p>
             <a:fld id="{75C51FCE-E4BB-4680-8E50-3C0E348D2609}" type="datetimeFigureOut">
               <a:rPr lang="en-US" dirty="0"/>
-              <a:t>12/19/2018</a:t>
+              <a:t>12/29/2018</a:t>
             </a:fld>
             <a:endParaRPr lang="en-US" dirty="0"/>
           </a:p>
@@ -9956,7 +9956,7 @@
           <a:p>
             <a:fld id="{8AAA073D-A903-47F8-8D16-77642FB0DF1F}" type="datetimeFigureOut">
               <a:rPr lang="en-US" dirty="0"/>
-              <a:t>12/19/2018</a:t>
+              <a:t>12/29/2018</a:t>
             </a:fld>
             <a:endParaRPr lang="en-US" dirty="0"/>
           </a:p>
@@ -10228,7 +10228,7 @@
           <a:p>
             <a:fld id="{AB91FA40-626B-4CA1-85D0-7A9016E395BA}" type="datetimeFigureOut">
               <a:rPr lang="en-US" dirty="0"/>
-              <a:t>12/19/2018</a:t>
+              <a:t>12/29/2018</a:t>
             </a:fld>
             <a:endParaRPr lang="en-US" dirty="0"/>
           </a:p>
@@ -10610,7 +10610,7 @@
           <a:p>
             <a:fld id="{C3F425EA-B9DC-48A7-991E-9A82573B1B21}" type="datetimeFigureOut">
               <a:rPr lang="en-US" dirty="0"/>
-              <a:t>12/19/2018</a:t>
+              <a:t>12/29/2018</a:t>
             </a:fld>
             <a:endParaRPr lang="en-US" dirty="0"/>
           </a:p>
@@ -10728,7 +10728,7 @@
           <a:p>
             <a:fld id="{66CB97F8-6CEB-469B-AFCC-889F2A2B1D5A}" type="datetimeFigureOut">
               <a:rPr lang="en-US" dirty="0"/>
-              <a:t>12/19/2018</a:t>
+              <a:t>12/29/2018</a:t>
             </a:fld>
             <a:endParaRPr lang="en-US" dirty="0"/>
           </a:p>
@@ -10823,7 +10823,7 @@
           <a:p>
             <a:fld id="{8FA9179F-009E-4FA5-B091-7EBB82A185BD}" type="datetimeFigureOut">
               <a:rPr lang="en-US" dirty="0"/>
-              <a:t>12/19/2018</a:t>
+              <a:t>12/29/2018</a:t>
             </a:fld>
             <a:endParaRPr lang="en-US" dirty="0"/>
           </a:p>
@@ -11932,7 +11932,7 @@
           <a:p>
             <a:fld id="{8E665CEB-0076-4E37-B880-BCEA9784DE0A}" type="datetimeFigureOut">
               <a:rPr lang="en-US" dirty="0"/>
-              <a:t>12/19/2018</a:t>
+              <a:t>12/29/2018</a:t>
             </a:fld>
             <a:endParaRPr lang="en-US" dirty="0"/>
           </a:p>
@@ -13065,7 +13065,7 @@
           <a:p>
             <a:fld id="{A6149E5E-3896-4118-99A7-7B85668F1C5E}" type="datetimeFigureOut">
               <a:rPr lang="en-US" dirty="0"/>
-              <a:t>12/19/2018</a:t>
+              <a:t>12/29/2018</a:t>
             </a:fld>
             <a:endParaRPr lang="en-US" dirty="0"/>
           </a:p>
@@ -14093,7 +14093,7 @@
           <a:p>
             <a:fld id="{7E0D914D-B099-4142-A885-11F276715148}" type="datetimeFigureOut">
               <a:rPr lang="en-US" dirty="0"/>
-              <a:t>12/19/2018</a:t>
+              <a:t>12/29/2018</a:t>
             </a:fld>
             <a:endParaRPr lang="en-US" dirty="0"/>
           </a:p>
@@ -17897,10 +17897,15 @@
             <a:spLocks noGrp="1"/>
           </p:cNvSpPr>
           <p:nvPr>
-            <p:ph type="title"/>
+            <p:ph type="title" idx="4294967295"/>
           </p:nvPr>
         </p:nvSpPr>
-        <p:spPr/>
+        <p:spPr>
+          <a:xfrm>
+            <a:off x="0" y="-474663"/>
+            <a:ext cx="8194675" cy="382588"/>
+          </a:xfrm>
+        </p:spPr>
         <p:txBody>
           <a:bodyPr/>
           <a:lstStyle/>
@@ -17962,316 +17967,6 @@
       </p:pic>
       <p:sp>
         <p:nvSpPr>
-          <p:cNvPr id="104" name="Freeform 103"/>
-          <p:cNvSpPr/>
-          <p:nvPr/>
-        </p:nvSpPr>
-        <p:spPr>
-          <a:xfrm rot="2700000">
-            <a:off x="10309393" y="4665109"/>
-            <a:ext cx="805094" cy="819671"/>
-          </a:xfrm>
-          <a:custGeom>
-            <a:avLst/>
-            <a:gdLst>
-              <a:gd name="connsiteX0" fmla="*/ 0 w 934558"/>
-              <a:gd name="connsiteY0" fmla="*/ 0 h 934559"/>
-              <a:gd name="connsiteX1" fmla="*/ 934558 w 934558"/>
-              <a:gd name="connsiteY1" fmla="*/ 934559 h 934559"/>
-              <a:gd name="connsiteX2" fmla="*/ 390429 w 934558"/>
-              <a:gd name="connsiteY2" fmla="*/ 934559 h 934559"/>
-              <a:gd name="connsiteX3" fmla="*/ 383371 w 934558"/>
-              <a:gd name="connsiteY3" fmla="*/ 860917 h 934559"/>
-              <a:gd name="connsiteX4" fmla="*/ 275837 w 934558"/>
-              <a:gd name="connsiteY4" fmla="*/ 658797 h 934559"/>
-              <a:gd name="connsiteX5" fmla="*/ 73717 w 934558"/>
-              <a:gd name="connsiteY5" fmla="*/ 551263 h 934559"/>
-              <a:gd name="connsiteX6" fmla="*/ 0 w 934558"/>
-              <a:gd name="connsiteY6" fmla="*/ 544198 h 934559"/>
-            </a:gdLst>
-            <a:ahLst/>
-            <a:cxnLst>
-              <a:cxn ang="0">
-                <a:pos x="connsiteX0" y="connsiteY0"/>
-              </a:cxn>
-              <a:cxn ang="0">
-                <a:pos x="connsiteX1" y="connsiteY1"/>
-              </a:cxn>
-              <a:cxn ang="0">
-                <a:pos x="connsiteX2" y="connsiteY2"/>
-              </a:cxn>
-              <a:cxn ang="0">
-                <a:pos x="connsiteX3" y="connsiteY3"/>
-              </a:cxn>
-              <a:cxn ang="0">
-                <a:pos x="connsiteX4" y="connsiteY4"/>
-              </a:cxn>
-              <a:cxn ang="0">
-                <a:pos x="connsiteX5" y="connsiteY5"/>
-              </a:cxn>
-              <a:cxn ang="0">
-                <a:pos x="connsiteX6" y="connsiteY6"/>
-              </a:cxn>
-            </a:cxnLst>
-            <a:rect l="l" t="t" r="r" b="b"/>
-            <a:pathLst>
-              <a:path w="934558" h="934559">
-                <a:moveTo>
-                  <a:pt x="0" y="0"/>
-                </a:moveTo>
-                <a:cubicBezTo>
-                  <a:pt x="516142" y="0"/>
-                  <a:pt x="934558" y="418416"/>
-                  <a:pt x="934558" y="934559"/>
-                </a:cubicBezTo>
-                <a:lnTo>
-                  <a:pt x="390429" y="934559"/>
-                </a:lnTo>
-                <a:lnTo>
-                  <a:pt x="383371" y="860917"/>
-                </a:lnTo>
-                <a:cubicBezTo>
-                  <a:pt x="369033" y="786863"/>
-                  <a:pt x="333189" y="716148"/>
-                  <a:pt x="275837" y="658797"/>
-                </a:cubicBezTo>
-                <a:cubicBezTo>
-                  <a:pt x="218486" y="601445"/>
-                  <a:pt x="147772" y="565601"/>
-                  <a:pt x="73717" y="551263"/>
-                </a:cubicBezTo>
-                <a:lnTo>
-                  <a:pt x="0" y="544198"/>
-                </a:lnTo>
-                <a:close/>
-              </a:path>
-            </a:pathLst>
-          </a:custGeom>
-          <a:solidFill>
-            <a:srgbClr val="000000">
-              <a:alpha val="0"/>
-            </a:srgbClr>
-          </a:solidFill>
-          <a:ln>
-            <a:noFill/>
-          </a:ln>
-        </p:spPr>
-        <p:style>
-          <a:lnRef idx="2">
-            <a:schemeClr val="lt1">
-              <a:hueOff val="0"/>
-              <a:satOff val="0"/>
-              <a:lumOff val="0"/>
-              <a:alphaOff val="0"/>
-            </a:schemeClr>
-          </a:lnRef>
-          <a:fillRef idx="1">
-            <a:schemeClr val="accent5">
-              <a:hueOff val="-3311292"/>
-              <a:satOff val="13270"/>
-              <a:lumOff val="2876"/>
-              <a:alphaOff val="0"/>
-            </a:schemeClr>
-          </a:fillRef>
-          <a:effectRef idx="0">
-            <a:schemeClr val="accent5">
-              <a:hueOff val="-3311292"/>
-              <a:satOff val="13270"/>
-              <a:lumOff val="2876"/>
-              <a:alphaOff val="0"/>
-            </a:schemeClr>
-          </a:effectRef>
-          <a:fontRef idx="minor">
-            <a:schemeClr val="lt1"/>
-          </a:fontRef>
-        </p:style>
-        <p:txBody>
-          <a:bodyPr spcFirstLastPara="0" vert="horz" wrap="square" lIns="110947" tIns="484774" rIns="484774" bIns="110947" numCol="1" spcCol="1270" anchor="ctr" anchorCtr="0">
-            <a:noAutofit/>
-          </a:bodyPr>
-          <a:lstStyle/>
-          <a:p>
-            <a:pPr algn="ctr" defTabSz="693420">
-              <a:lnSpc>
-                <a:spcPct val="90000"/>
-              </a:lnSpc>
-              <a:spcBef>
-                <a:spcPct val="0"/>
-              </a:spcBef>
-              <a:spcAft>
-                <a:spcPct val="35000"/>
-              </a:spcAft>
-            </a:pPr>
-            <a:endParaRPr lang="es-ES" sz="1560"/>
-          </a:p>
-        </p:txBody>
-      </p:sp>
-      <p:sp>
-        <p:nvSpPr>
-          <p:cNvPr id="107" name="Freeform 106"/>
-          <p:cNvSpPr/>
-          <p:nvPr/>
-        </p:nvSpPr>
-        <p:spPr>
-          <a:xfrm rot="18900000">
-            <a:off x="9714401" y="4099250"/>
-            <a:ext cx="817027" cy="802500"/>
-          </a:xfrm>
-          <a:custGeom>
-            <a:avLst/>
-            <a:gdLst>
-              <a:gd name="connsiteX0" fmla="*/ 658702 w 931545"/>
-              <a:gd name="connsiteY0" fmla="*/ 272844 h 931546"/>
-              <a:gd name="connsiteX1" fmla="*/ 931545 w 931545"/>
-              <a:gd name="connsiteY1" fmla="*/ 931546 h 931546"/>
-              <a:gd name="connsiteX2" fmla="*/ 380528 w 931545"/>
-              <a:gd name="connsiteY2" fmla="*/ 931546 h 931546"/>
-              <a:gd name="connsiteX3" fmla="*/ 381174 w 931545"/>
-              <a:gd name="connsiteY3" fmla="*/ 924800 h 931546"/>
-              <a:gd name="connsiteX4" fmla="*/ 266471 w 931545"/>
-              <a:gd name="connsiteY4" fmla="*/ 647882 h 931546"/>
-              <a:gd name="connsiteX5" fmla="*/ 64351 w 931545"/>
-              <a:gd name="connsiteY5" fmla="*/ 540348 h 931546"/>
-              <a:gd name="connsiteX6" fmla="*/ 0 w 931545"/>
-              <a:gd name="connsiteY6" fmla="*/ 534180 h 931546"/>
-              <a:gd name="connsiteX7" fmla="*/ 0 w 931545"/>
-              <a:gd name="connsiteY7" fmla="*/ 0 h 931546"/>
-              <a:gd name="connsiteX8" fmla="*/ 658702 w 931545"/>
-              <a:gd name="connsiteY8" fmla="*/ 272844 h 931546"/>
-            </a:gdLst>
-            <a:ahLst/>
-            <a:cxnLst>
-              <a:cxn ang="0">
-                <a:pos x="connsiteX0" y="connsiteY0"/>
-              </a:cxn>
-              <a:cxn ang="0">
-                <a:pos x="connsiteX1" y="connsiteY1"/>
-              </a:cxn>
-              <a:cxn ang="0">
-                <a:pos x="connsiteX2" y="connsiteY2"/>
-              </a:cxn>
-              <a:cxn ang="0">
-                <a:pos x="connsiteX3" y="connsiteY3"/>
-              </a:cxn>
-              <a:cxn ang="0">
-                <a:pos x="connsiteX4" y="connsiteY4"/>
-              </a:cxn>
-              <a:cxn ang="0">
-                <a:pos x="connsiteX5" y="connsiteY5"/>
-              </a:cxn>
-              <a:cxn ang="0">
-                <a:pos x="connsiteX6" y="connsiteY6"/>
-              </a:cxn>
-              <a:cxn ang="0">
-                <a:pos x="connsiteX7" y="connsiteY7"/>
-              </a:cxn>
-              <a:cxn ang="0">
-                <a:pos x="connsiteX8" y="connsiteY8"/>
-              </a:cxn>
-            </a:cxnLst>
-            <a:rect l="l" t="t" r="r" b="b"/>
-            <a:pathLst>
-              <a:path w="931545" h="931546">
-                <a:moveTo>
-                  <a:pt x="658702" y="272844"/>
-                </a:moveTo>
-                <a:cubicBezTo>
-                  <a:pt x="827278" y="441420"/>
-                  <a:pt x="931545" y="674307"/>
-                  <a:pt x="931545" y="931546"/>
-                </a:cubicBezTo>
-                <a:lnTo>
-                  <a:pt x="380528" y="931546"/>
-                </a:lnTo>
-                <a:lnTo>
-                  <a:pt x="381174" y="924800"/>
-                </a:lnTo>
-                <a:cubicBezTo>
-                  <a:pt x="381175" y="824576"/>
-                  <a:pt x="342940" y="724351"/>
-                  <a:pt x="266471" y="647882"/>
-                </a:cubicBezTo>
-                <a:cubicBezTo>
-                  <a:pt x="209120" y="590531"/>
-                  <a:pt x="138406" y="554686"/>
-                  <a:pt x="64351" y="540348"/>
-                </a:cubicBezTo>
-                <a:lnTo>
-                  <a:pt x="0" y="534180"/>
-                </a:lnTo>
-                <a:lnTo>
-                  <a:pt x="0" y="0"/>
-                </a:lnTo>
-                <a:cubicBezTo>
-                  <a:pt x="257239" y="0"/>
-                  <a:pt x="490125" y="104267"/>
-                  <a:pt x="658702" y="272844"/>
-                </a:cubicBezTo>
-                <a:close/>
-              </a:path>
-            </a:pathLst>
-          </a:custGeom>
-          <a:solidFill>
-            <a:srgbClr val="000000">
-              <a:alpha val="0"/>
-            </a:srgbClr>
-          </a:solidFill>
-          <a:ln>
-            <a:noFill/>
-          </a:ln>
-        </p:spPr>
-        <p:style>
-          <a:lnRef idx="2">
-            <a:schemeClr val="lt1">
-              <a:hueOff val="0"/>
-              <a:satOff val="0"/>
-              <a:lumOff val="0"/>
-              <a:alphaOff val="0"/>
-            </a:schemeClr>
-          </a:lnRef>
-          <a:fillRef idx="1">
-            <a:schemeClr val="accent5">
-              <a:hueOff val="-3311292"/>
-              <a:satOff val="13270"/>
-              <a:lumOff val="2876"/>
-              <a:alphaOff val="0"/>
-            </a:schemeClr>
-          </a:fillRef>
-          <a:effectRef idx="0">
-            <a:schemeClr val="accent5">
-              <a:hueOff val="-3311292"/>
-              <a:satOff val="13270"/>
-              <a:lumOff val="2876"/>
-              <a:alphaOff val="0"/>
-            </a:schemeClr>
-          </a:effectRef>
-          <a:fontRef idx="minor">
-            <a:schemeClr val="lt1"/>
-          </a:fontRef>
-        </p:style>
-        <p:txBody>
-          <a:bodyPr spcFirstLastPara="0" vert="horz" wrap="square" lIns="110947" tIns="484774" rIns="484774" bIns="110947" numCol="1" spcCol="1270" anchor="ctr" anchorCtr="0">
-            <a:noAutofit/>
-          </a:bodyPr>
-          <a:lstStyle/>
-          <a:p>
-            <a:pPr algn="ctr" defTabSz="693420">
-              <a:lnSpc>
-                <a:spcPct val="90000"/>
-              </a:lnSpc>
-              <a:spcBef>
-                <a:spcPct val="0"/>
-              </a:spcBef>
-              <a:spcAft>
-                <a:spcPct val="35000"/>
-              </a:spcAft>
-            </a:pPr>
-            <a:endParaRPr lang="es-ES" sz="1560"/>
-          </a:p>
-        </p:txBody>
-      </p:sp>
-      <p:sp>
-        <p:nvSpPr>
           <p:cNvPr id="11" name="Rectangle 10"/>
           <p:cNvSpPr/>
           <p:nvPr/>
@@ -19145,10 +18840,15 @@
             <a:spLocks noGrp="1"/>
           </p:cNvSpPr>
           <p:nvPr>
-            <p:ph type="title"/>
+            <p:ph type="title" idx="4294967295"/>
           </p:nvPr>
         </p:nvSpPr>
-        <p:spPr/>
+        <p:spPr>
+          <a:xfrm>
+            <a:off x="0" y="-474663"/>
+            <a:ext cx="8194675" cy="382588"/>
+          </a:xfrm>
+        </p:spPr>
         <p:txBody>
           <a:bodyPr/>
           <a:lstStyle/>
@@ -20154,10 +19854,15 @@
             <a:spLocks noGrp="1"/>
           </p:cNvSpPr>
           <p:nvPr>
-            <p:ph type="title"/>
+            <p:ph type="title" idx="4294967295"/>
           </p:nvPr>
         </p:nvSpPr>
-        <p:spPr/>
+        <p:spPr>
+          <a:xfrm>
+            <a:off x="0" y="-474663"/>
+            <a:ext cx="8194675" cy="382588"/>
+          </a:xfrm>
+        </p:spPr>
         <p:txBody>
           <a:bodyPr/>
           <a:lstStyle/>

</xml_diff>